<commit_message>
Updated deck and notebook
</commit_message>
<xml_diff>
--- a/brussels/deck_overview.pptx
+++ b/brussels/deck_overview.pptx
@@ -136,7 +136,7 @@
               <a:rPr b="0" lang="en-GB" sz="1400" spc="-1" strike="noStrike">
                 <a:latin typeface="Times New Roman"/>
               </a:rPr>
-              <a:t> </a:t>
+              <a:t>&lt;header&gt;</a:t>
             </a:r>
             <a:endParaRPr b="0" lang="en-GB" sz="1400" spc="-1" strike="noStrike">
               <a:latin typeface="Times New Roman"/>
@@ -171,7 +171,7 @@
               <a:rPr b="0" lang="en-GB" sz="1400" spc="-1" strike="noStrike">
                 <a:latin typeface="Times New Roman"/>
               </a:rPr>
-              <a:t> </a:t>
+              <a:t>&lt;date/time&gt;</a:t>
             </a:r>
             <a:endParaRPr b="0" lang="en-GB" sz="1400" spc="-1" strike="noStrike">
               <a:latin typeface="Times New Roman"/>
@@ -205,7 +205,7 @@
               <a:rPr b="0" lang="en-GB" sz="1400" spc="-1" strike="noStrike">
                 <a:latin typeface="Times New Roman"/>
               </a:rPr>
-              <a:t> </a:t>
+              <a:t>&lt;footer&gt;</a:t>
             </a:r>
             <a:endParaRPr b="0" lang="en-GB" sz="1400" spc="-1" strike="noStrike">
               <a:latin typeface="Times New Roman"/>
@@ -236,11 +236,11 @@
           <a:bodyPr lIns="0" rIns="0" tIns="0" bIns="0" anchor="b"/>
           <a:p>
             <a:pPr algn="r"/>
-            <a:fld id="{409B2204-5ABE-442B-BEA1-9E0C48334816}" type="slidenum">
+            <a:fld id="{DE492EC4-4E6E-4386-BF10-3926255F8DA9}" type="slidenum">
               <a:rPr b="0" lang="en-GB" sz="1400" spc="-1" strike="noStrike">
                 <a:latin typeface="Times New Roman"/>
               </a:rPr>
-              <a:t>1</a:t>
+              <a:t>&lt;number&gt;</a:t>
             </a:fld>
             <a:endParaRPr b="0" lang="en-GB" sz="1400" spc="-1" strike="noStrike">
               <a:latin typeface="Times New Roman"/>
@@ -284,7 +284,7 @@
         <p:spPr>
           <a:xfrm>
             <a:off x="685800" y="4343400"/>
-            <a:ext cx="5485680" cy="4114080"/>
+            <a:ext cx="5485320" cy="4113720"/>
           </a:xfrm>
           <a:prstGeom prst="rect">
             <a:avLst/>
@@ -293,7 +293,7 @@
         <p:txBody>
           <a:bodyPr lIns="0" rIns="0" tIns="0" bIns="0"/>
           <a:p>
-            <a:pPr marL="216000" indent="-216000">
+            <a:pPr marL="216000" indent="-215640">
               <a:lnSpc>
                 <a:spcPct val="100000"/>
               </a:lnSpc>
@@ -319,7 +319,7 @@
         <p:spPr>
           <a:xfrm>
             <a:off x="3884760" y="8685360"/>
-            <a:ext cx="2971080" cy="456480"/>
+            <a:ext cx="2970720" cy="456120"/>
           </a:xfrm>
           <a:prstGeom prst="rect">
             <a:avLst/>
@@ -335,29 +335,6 @@
           <a:effectRef idx="0"/>
           <a:fontRef idx="minor"/>
         </p:style>
-        <p:txBody>
-          <a:bodyPr lIns="90000" rIns="90000" tIns="45000" bIns="45000" anchor="b"/>
-          <a:p>
-            <a:pPr algn="r">
-              <a:lnSpc>
-                <a:spcPct val="100000"/>
-              </a:lnSpc>
-            </a:pPr>
-            <a:fld id="{1268AC69-3AAD-4031-B604-5022BE01BE8D}" type="slidenum">
-              <a:rPr b="0" lang="en-GB" sz="1200" spc="-1" strike="noStrike">
-                <a:solidFill>
-                  <a:srgbClr val="000000"/>
-                </a:solidFill>
-                <a:latin typeface="+mn-lt"/>
-                <a:ea typeface="+mn-ea"/>
-              </a:rPr>
-              <a:t>1</a:t>
-            </a:fld>
-            <a:endParaRPr b="0" lang="en-GB" sz="1200" spc="-1" strike="noStrike">
-              <a:latin typeface="Arial"/>
-            </a:endParaRPr>
-          </a:p>
-        </p:txBody>
       </p:sp>
     </p:spTree>
   </p:cSld>
@@ -394,7 +371,7 @@
         <p:spPr>
           <a:xfrm>
             <a:off x="685800" y="4343400"/>
-            <a:ext cx="5485680" cy="4114080"/>
+            <a:ext cx="5485320" cy="4113720"/>
           </a:xfrm>
           <a:prstGeom prst="rect">
             <a:avLst/>
@@ -418,7 +395,7 @@
         <p:spPr>
           <a:xfrm>
             <a:off x="3884760" y="8685360"/>
-            <a:ext cx="2971080" cy="456480"/>
+            <a:ext cx="2970720" cy="456120"/>
           </a:xfrm>
           <a:prstGeom prst="rect">
             <a:avLst/>
@@ -434,29 +411,6 @@
           <a:effectRef idx="0"/>
           <a:fontRef idx="minor"/>
         </p:style>
-        <p:txBody>
-          <a:bodyPr lIns="90000" rIns="90000" tIns="45000" bIns="45000" anchor="b"/>
-          <a:p>
-            <a:pPr algn="r">
-              <a:lnSpc>
-                <a:spcPct val="100000"/>
-              </a:lnSpc>
-            </a:pPr>
-            <a:fld id="{50F727FB-D1EE-472F-94A8-8D618326DB3B}" type="slidenum">
-              <a:rPr b="0" lang="en-GB" sz="1200" spc="-1" strike="noStrike">
-                <a:solidFill>
-                  <a:srgbClr val="000000"/>
-                </a:solidFill>
-                <a:latin typeface="+mn-lt"/>
-                <a:ea typeface="+mn-ea"/>
-              </a:rPr>
-              <a:t>1</a:t>
-            </a:fld>
-            <a:endParaRPr b="0" lang="en-GB" sz="1200" spc="-1" strike="noStrike">
-              <a:latin typeface="Arial"/>
-            </a:endParaRPr>
-          </a:p>
-        </p:txBody>
       </p:sp>
     </p:spTree>
   </p:cSld>
@@ -493,7 +447,7 @@
         <p:spPr>
           <a:xfrm>
             <a:off x="685800" y="4343400"/>
-            <a:ext cx="5485680" cy="4114080"/>
+            <a:ext cx="5485320" cy="4113720"/>
           </a:xfrm>
           <a:prstGeom prst="rect">
             <a:avLst/>
@@ -517,7 +471,7 @@
         <p:spPr>
           <a:xfrm>
             <a:off x="3884760" y="8685360"/>
-            <a:ext cx="2971080" cy="456480"/>
+            <a:ext cx="2970720" cy="456120"/>
           </a:xfrm>
           <a:prstGeom prst="rect">
             <a:avLst/>
@@ -533,29 +487,6 @@
           <a:effectRef idx="0"/>
           <a:fontRef idx="minor"/>
         </p:style>
-        <p:txBody>
-          <a:bodyPr lIns="90000" rIns="90000" tIns="45000" bIns="45000" anchor="b"/>
-          <a:p>
-            <a:pPr algn="r">
-              <a:lnSpc>
-                <a:spcPct val="100000"/>
-              </a:lnSpc>
-            </a:pPr>
-            <a:fld id="{C042373B-8C19-4BFF-B515-D80E7F5869FE}" type="slidenum">
-              <a:rPr b="0" lang="en-GB" sz="1200" spc="-1" strike="noStrike">
-                <a:solidFill>
-                  <a:srgbClr val="000000"/>
-                </a:solidFill>
-                <a:latin typeface="+mn-lt"/>
-                <a:ea typeface="+mn-ea"/>
-              </a:rPr>
-              <a:t>1</a:t>
-            </a:fld>
-            <a:endParaRPr b="0" lang="en-GB" sz="1200" spc="-1" strike="noStrike">
-              <a:latin typeface="Arial"/>
-            </a:endParaRPr>
-          </a:p>
-        </p:txBody>
       </p:sp>
     </p:spTree>
   </p:cSld>
@@ -592,7 +523,7 @@
         <p:spPr>
           <a:xfrm>
             <a:off x="685800" y="4343400"/>
-            <a:ext cx="5485680" cy="4114080"/>
+            <a:ext cx="5485320" cy="4113720"/>
           </a:xfrm>
           <a:prstGeom prst="rect">
             <a:avLst/>
@@ -601,7 +532,7 @@
         <p:txBody>
           <a:bodyPr lIns="0" rIns="0" tIns="0" bIns="0"/>
           <a:p>
-            <a:pPr marL="216000" indent="-216000">
+            <a:pPr marL="216000" indent="-215640">
               <a:lnSpc>
                 <a:spcPct val="120000"/>
               </a:lnSpc>
@@ -620,7 +551,7 @@
             </a:endParaRPr>
           </a:p>
           <a:p>
-            <a:pPr marL="216000" indent="-216000">
+            <a:pPr marL="216000" indent="-215640">
               <a:lnSpc>
                 <a:spcPct val="120000"/>
               </a:lnSpc>
@@ -644,7 +575,7 @@
             </a:endParaRPr>
           </a:p>
           <a:p>
-            <a:pPr marL="216000" indent="-216000">
+            <a:pPr marL="216000" indent="-215640">
               <a:lnSpc>
                 <a:spcPct val="120000"/>
               </a:lnSpc>
@@ -668,7 +599,7 @@
             </a:endParaRPr>
           </a:p>
           <a:p>
-            <a:pPr marL="216000" indent="-216000">
+            <a:pPr marL="216000" indent="-215640">
               <a:lnSpc>
                 <a:spcPct val="120000"/>
               </a:lnSpc>
@@ -692,7 +623,7 @@
             </a:endParaRPr>
           </a:p>
           <a:p>
-            <a:pPr marL="216000" indent="-216000">
+            <a:pPr marL="216000" indent="-215640">
               <a:lnSpc>
                 <a:spcPct val="120000"/>
               </a:lnSpc>
@@ -716,7 +647,7 @@
             </a:endParaRPr>
           </a:p>
           <a:p>
-            <a:pPr marL="216000" indent="-216000">
+            <a:pPr marL="216000" indent="-215640">
               <a:lnSpc>
                 <a:spcPct val="120000"/>
               </a:lnSpc>
@@ -736,7 +667,7 @@
         <p:spPr>
           <a:xfrm>
             <a:off x="3884760" y="8685360"/>
-            <a:ext cx="2971080" cy="456480"/>
+            <a:ext cx="2970720" cy="456120"/>
           </a:xfrm>
           <a:prstGeom prst="rect">
             <a:avLst/>
@@ -752,29 +683,6 @@
           <a:effectRef idx="0"/>
           <a:fontRef idx="minor"/>
         </p:style>
-        <p:txBody>
-          <a:bodyPr lIns="90000" rIns="90000" tIns="45000" bIns="45000" anchor="b"/>
-          <a:p>
-            <a:pPr algn="r">
-              <a:lnSpc>
-                <a:spcPct val="100000"/>
-              </a:lnSpc>
-            </a:pPr>
-            <a:fld id="{DD47AB73-32AF-43C4-AEDE-D308826CB08A}" type="slidenum">
-              <a:rPr b="0" lang="en-GB" sz="1200" spc="-1" strike="noStrike">
-                <a:solidFill>
-                  <a:srgbClr val="000000"/>
-                </a:solidFill>
-                <a:latin typeface="+mn-lt"/>
-                <a:ea typeface="+mn-ea"/>
-              </a:rPr>
-              <a:t>1</a:t>
-            </a:fld>
-            <a:endParaRPr b="0" lang="en-GB" sz="1200" spc="-1" strike="noStrike">
-              <a:latin typeface="Arial"/>
-            </a:endParaRPr>
-          </a:p>
-        </p:txBody>
       </p:sp>
     </p:spTree>
   </p:cSld>
@@ -811,7 +719,7 @@
         <p:spPr>
           <a:xfrm>
             <a:off x="685800" y="4343400"/>
-            <a:ext cx="5485680" cy="4114080"/>
+            <a:ext cx="5485320" cy="4113720"/>
           </a:xfrm>
           <a:prstGeom prst="rect">
             <a:avLst/>
@@ -835,7 +743,7 @@
         <p:spPr>
           <a:xfrm>
             <a:off x="3884760" y="8685360"/>
-            <a:ext cx="2971080" cy="456480"/>
+            <a:ext cx="2970720" cy="456120"/>
           </a:xfrm>
           <a:prstGeom prst="rect">
             <a:avLst/>
@@ -851,29 +759,6 @@
           <a:effectRef idx="0"/>
           <a:fontRef idx="minor"/>
         </p:style>
-        <p:txBody>
-          <a:bodyPr lIns="90000" rIns="90000" tIns="45000" bIns="45000" anchor="b"/>
-          <a:p>
-            <a:pPr algn="r">
-              <a:lnSpc>
-                <a:spcPct val="100000"/>
-              </a:lnSpc>
-            </a:pPr>
-            <a:fld id="{B548C6D2-48FB-4468-8020-35941A55D61B}" type="slidenum">
-              <a:rPr b="0" lang="en-GB" sz="1200" spc="-1" strike="noStrike">
-                <a:solidFill>
-                  <a:srgbClr val="000000"/>
-                </a:solidFill>
-                <a:latin typeface="+mn-lt"/>
-                <a:ea typeface="+mn-ea"/>
-              </a:rPr>
-              <a:t>1</a:t>
-            </a:fld>
-            <a:endParaRPr b="0" lang="en-GB" sz="1200" spc="-1" strike="noStrike">
-              <a:latin typeface="Arial"/>
-            </a:endParaRPr>
-          </a:p>
-        </p:txBody>
       </p:sp>
     </p:spTree>
   </p:cSld>
@@ -910,7 +795,7 @@
         <p:spPr>
           <a:xfrm>
             <a:off x="685800" y="4343400"/>
-            <a:ext cx="5485680" cy="4114080"/>
+            <a:ext cx="5485320" cy="4113720"/>
           </a:xfrm>
           <a:prstGeom prst="rect">
             <a:avLst/>
@@ -934,7 +819,7 @@
         <p:spPr>
           <a:xfrm>
             <a:off x="3884760" y="8685360"/>
-            <a:ext cx="2971080" cy="456480"/>
+            <a:ext cx="2970720" cy="456120"/>
           </a:xfrm>
           <a:prstGeom prst="rect">
             <a:avLst/>
@@ -950,29 +835,6 @@
           <a:effectRef idx="0"/>
           <a:fontRef idx="minor"/>
         </p:style>
-        <p:txBody>
-          <a:bodyPr lIns="90000" rIns="90000" tIns="45000" bIns="45000" anchor="b"/>
-          <a:p>
-            <a:pPr algn="r">
-              <a:lnSpc>
-                <a:spcPct val="100000"/>
-              </a:lnSpc>
-            </a:pPr>
-            <a:fld id="{1E4DC4E5-F706-4552-B6AF-123D8B489F34}" type="slidenum">
-              <a:rPr b="0" lang="en-GB" sz="1200" spc="-1" strike="noStrike">
-                <a:solidFill>
-                  <a:srgbClr val="000000"/>
-                </a:solidFill>
-                <a:latin typeface="+mn-lt"/>
-                <a:ea typeface="+mn-ea"/>
-              </a:rPr>
-              <a:t>1</a:t>
-            </a:fld>
-            <a:endParaRPr b="0" lang="en-GB" sz="1200" spc="-1" strike="noStrike">
-              <a:latin typeface="Arial"/>
-            </a:endParaRPr>
-          </a:p>
-        </p:txBody>
       </p:sp>
     </p:spTree>
   </p:cSld>
@@ -1009,7 +871,7 @@
         <p:spPr>
           <a:xfrm>
             <a:off x="685800" y="4343400"/>
-            <a:ext cx="5485680" cy="4114080"/>
+            <a:ext cx="5485320" cy="4113720"/>
           </a:xfrm>
           <a:prstGeom prst="rect">
             <a:avLst/>
@@ -1033,7 +895,7 @@
         <p:spPr>
           <a:xfrm>
             <a:off x="3884760" y="8685360"/>
-            <a:ext cx="2971080" cy="456480"/>
+            <a:ext cx="2970720" cy="456120"/>
           </a:xfrm>
           <a:prstGeom prst="rect">
             <a:avLst/>
@@ -1049,29 +911,6 @@
           <a:effectRef idx="0"/>
           <a:fontRef idx="minor"/>
         </p:style>
-        <p:txBody>
-          <a:bodyPr lIns="90000" rIns="90000" tIns="45000" bIns="45000" anchor="b"/>
-          <a:p>
-            <a:pPr algn="r">
-              <a:lnSpc>
-                <a:spcPct val="100000"/>
-              </a:lnSpc>
-            </a:pPr>
-            <a:fld id="{AC407BD8-4E5B-43BD-AE31-07F35905FCEF}" type="slidenum">
-              <a:rPr b="0" lang="en-GB" sz="1200" spc="-1" strike="noStrike">
-                <a:solidFill>
-                  <a:srgbClr val="000000"/>
-                </a:solidFill>
-                <a:latin typeface="+mn-lt"/>
-                <a:ea typeface="+mn-ea"/>
-              </a:rPr>
-              <a:t>1</a:t>
-            </a:fld>
-            <a:endParaRPr b="0" lang="en-GB" sz="1200" spc="-1" strike="noStrike">
-              <a:latin typeface="Arial"/>
-            </a:endParaRPr>
-          </a:p>
-        </p:txBody>
       </p:sp>
     </p:spTree>
   </p:cSld>
@@ -1108,7 +947,7 @@
         <p:spPr>
           <a:xfrm>
             <a:off x="685800" y="4343400"/>
-            <a:ext cx="5485680" cy="4114080"/>
+            <a:ext cx="5485320" cy="4113720"/>
           </a:xfrm>
           <a:prstGeom prst="rect">
             <a:avLst/>
@@ -1132,7 +971,7 @@
         <p:spPr>
           <a:xfrm>
             <a:off x="3884760" y="8685360"/>
-            <a:ext cx="2971080" cy="456480"/>
+            <a:ext cx="2970720" cy="456120"/>
           </a:xfrm>
           <a:prstGeom prst="rect">
             <a:avLst/>
@@ -1148,29 +987,6 @@
           <a:effectRef idx="0"/>
           <a:fontRef idx="minor"/>
         </p:style>
-        <p:txBody>
-          <a:bodyPr lIns="90000" rIns="90000" tIns="45000" bIns="45000" anchor="b"/>
-          <a:p>
-            <a:pPr algn="r">
-              <a:lnSpc>
-                <a:spcPct val="100000"/>
-              </a:lnSpc>
-            </a:pPr>
-            <a:fld id="{2A9A5B9A-2339-44C1-B651-1442C54FC5DC}" type="slidenum">
-              <a:rPr b="0" lang="en-GB" sz="1200" spc="-1" strike="noStrike">
-                <a:solidFill>
-                  <a:srgbClr val="000000"/>
-                </a:solidFill>
-                <a:latin typeface="+mn-lt"/>
-                <a:ea typeface="+mn-ea"/>
-              </a:rPr>
-              <a:t>&lt;number&gt;</a:t>
-            </a:fld>
-            <a:endParaRPr b="0" lang="en-GB" sz="1200" spc="-1" strike="noStrike">
-              <a:latin typeface="Arial"/>
-            </a:endParaRPr>
-          </a:p>
-        </p:txBody>
       </p:sp>
     </p:spTree>
   </p:cSld>
@@ -3898,43 +3714,31 @@
               <a:rPr b="0" lang="en-GB" sz="4400" spc="-1" strike="noStrike">
                 <a:latin typeface="Arial"/>
               </a:rPr>
-              <a:t>to </a:t>
+              <a:t>to edit </a:t>
             </a:r>
             <a:r>
               <a:rPr b="0" lang="en-GB" sz="4400" spc="-1" strike="noStrike">
                 <a:latin typeface="Arial"/>
               </a:rPr>
-              <a:t>edit </a:t>
+              <a:t>the </a:t>
             </a:r>
             <a:r>
               <a:rPr b="0" lang="en-GB" sz="4400" spc="-1" strike="noStrike">
                 <a:latin typeface="Arial"/>
               </a:rPr>
-              <a:t>the </a:t>
+              <a:t>title </a:t>
             </a:r>
             <a:r>
               <a:rPr b="0" lang="en-GB" sz="4400" spc="-1" strike="noStrike">
                 <a:latin typeface="Arial"/>
               </a:rPr>
-              <a:t>title </a:t>
+              <a:t>text </a:t>
             </a:r>
             <a:r>
               <a:rPr b="0" lang="en-GB" sz="4400" spc="-1" strike="noStrike">
                 <a:latin typeface="Arial"/>
               </a:rPr>
-              <a:t>text </a:t>
-            </a:r>
-            <a:r>
-              <a:rPr b="0" lang="en-GB" sz="4400" spc="-1" strike="noStrike">
-                <a:latin typeface="Arial"/>
-              </a:rPr>
-              <a:t>form</a:t>
-            </a:r>
-            <a:r>
-              <a:rPr b="0" lang="en-GB" sz="4400" spc="-1" strike="noStrike">
-                <a:latin typeface="Arial"/>
-              </a:rPr>
-              <a:t>at</a:t>
+              <a:t>format</a:t>
             </a:r>
             <a:endParaRPr b="0" lang="en-GB" sz="4400" spc="-1" strike="noStrike">
               <a:latin typeface="Arial"/>
@@ -4432,7 +4236,7 @@
         <p:spPr>
           <a:xfrm>
             <a:off x="0" y="0"/>
-            <a:ext cx="2742480" cy="5142960"/>
+            <a:ext cx="2742120" cy="5142600"/>
           </a:xfrm>
           <a:prstGeom prst="rect">
             <a:avLst/>
@@ -4460,7 +4264,7 @@
         <p:spPr>
           <a:xfrm>
             <a:off x="0" y="0"/>
-            <a:ext cx="2361600" cy="3028320"/>
+            <a:ext cx="2361240" cy="3027960"/>
           </a:xfrm>
           <a:prstGeom prst="rect">
             <a:avLst/>
@@ -4479,6 +4283,11 @@
         <p:txBody>
           <a:bodyPr lIns="360000" rIns="90000" tIns="360000" bIns="360000" anchor="ctr"/>
           <a:p>
+            <a:pPr>
+              <a:lnSpc>
+                <a:spcPct val="100000"/>
+              </a:lnSpc>
+            </a:pPr>
             <a:r>
               <a:rPr b="1" lang="en-GB" sz="2000" spc="-1" strike="noStrike">
                 <a:solidFill>
@@ -4494,6 +4303,11 @@
             </a:endParaRPr>
           </a:p>
           <a:p>
+            <a:pPr>
+              <a:lnSpc>
+                <a:spcPct val="100000"/>
+              </a:lnSpc>
+            </a:pPr>
             <a:endParaRPr b="0" lang="en-GB" sz="2000" spc="-1" strike="noStrike">
               <a:latin typeface="Arial"/>
             </a:endParaRPr>
@@ -4543,7 +4357,7 @@
         <p:spPr>
           <a:xfrm>
             <a:off x="504360" y="4476600"/>
-            <a:ext cx="790200" cy="300960"/>
+            <a:ext cx="789840" cy="300600"/>
           </a:xfrm>
           <a:prstGeom prst="rect">
             <a:avLst/>
@@ -4566,7 +4380,7 @@
         <p:spPr>
           <a:xfrm>
             <a:off x="2743200" y="-180000"/>
-            <a:ext cx="6400080" cy="5418000"/>
+            <a:ext cx="6399720" cy="5417640"/>
           </a:xfrm>
           <a:prstGeom prst="rect">
             <a:avLst/>
@@ -4634,7 +4448,7 @@
         <p:spPr>
           <a:xfrm flipH="1">
             <a:off x="-720" y="-19080"/>
-            <a:ext cx="1980360" cy="5142960"/>
+            <a:ext cx="1980000" cy="5142600"/>
           </a:xfrm>
           <a:prstGeom prst="rect">
             <a:avLst/>
@@ -4662,7 +4476,7 @@
         <p:spPr>
           <a:xfrm>
             <a:off x="205560" y="308880"/>
-            <a:ext cx="1570680" cy="303120"/>
+            <a:ext cx="1570320" cy="302760"/>
           </a:xfrm>
           <a:prstGeom prst="rect">
             <a:avLst/>
@@ -4711,7 +4525,7 @@
         <p:spPr>
           <a:xfrm>
             <a:off x="2819520" y="308880"/>
-            <a:ext cx="5714280" cy="3137400"/>
+            <a:ext cx="5713920" cy="3137040"/>
           </a:xfrm>
           <a:prstGeom prst="rect">
             <a:avLst/>
@@ -4730,7 +4544,7 @@
         <p:txBody>
           <a:bodyPr lIns="90000" rIns="90000" tIns="45000" bIns="45000"/>
           <a:p>
-            <a:pPr marL="216000" indent="-216000">
+            <a:pPr marL="216000" indent="-215640">
               <a:lnSpc>
                 <a:spcPct val="150000"/>
               </a:lnSpc>
@@ -4755,7 +4569,7 @@
             </a:endParaRPr>
           </a:p>
           <a:p>
-            <a:pPr marL="216000" indent="-216000">
+            <a:pPr marL="216000" indent="-215640">
               <a:lnSpc>
                 <a:spcPct val="150000"/>
               </a:lnSpc>
@@ -4780,7 +4594,7 @@
             </a:endParaRPr>
           </a:p>
           <a:p>
-            <a:pPr marL="216000" indent="-216000">
+            <a:pPr marL="216000" indent="-215640">
               <a:lnSpc>
                 <a:spcPct val="150000"/>
               </a:lnSpc>
@@ -4805,7 +4619,7 @@
             </a:endParaRPr>
           </a:p>
           <a:p>
-            <a:pPr marL="216000" indent="-216000">
+            <a:pPr marL="216000" indent="-215640">
               <a:lnSpc>
                 <a:spcPct val="150000"/>
               </a:lnSpc>
@@ -4830,7 +4644,7 @@
             </a:endParaRPr>
           </a:p>
           <a:p>
-            <a:pPr marL="216000" indent="-216000">
+            <a:pPr marL="216000" indent="-215640">
               <a:lnSpc>
                 <a:spcPct val="150000"/>
               </a:lnSpc>
@@ -4855,7 +4669,7 @@
             </a:endParaRPr>
           </a:p>
           <a:p>
-            <a:pPr marL="216000" indent="-216000">
+            <a:pPr marL="216000" indent="-215640">
               <a:lnSpc>
                 <a:spcPct val="150000"/>
               </a:lnSpc>
@@ -4880,7 +4694,7 @@
             </a:endParaRPr>
           </a:p>
           <a:p>
-            <a:pPr marL="216000" indent="-216000">
+            <a:pPr marL="216000" indent="-215640">
               <a:lnSpc>
                 <a:spcPct val="150000"/>
               </a:lnSpc>
@@ -4964,7 +4778,7 @@
         <p:spPr>
           <a:xfrm flipH="1">
             <a:off x="-720" y="-19080"/>
-            <a:ext cx="1980360" cy="5142960"/>
+            <a:ext cx="1980000" cy="5142600"/>
           </a:xfrm>
           <a:prstGeom prst="rect">
             <a:avLst/>
@@ -4992,7 +4806,7 @@
         <p:spPr>
           <a:xfrm>
             <a:off x="205560" y="308880"/>
-            <a:ext cx="1570680" cy="303120"/>
+            <a:ext cx="1570320" cy="302760"/>
           </a:xfrm>
           <a:prstGeom prst="rect">
             <a:avLst/>
@@ -5045,7 +4859,7 @@
         <p:spPr>
           <a:xfrm>
             <a:off x="3166920" y="284040"/>
-            <a:ext cx="4056480" cy="1818720"/>
+            <a:ext cx="4056120" cy="1818360"/>
           </a:xfrm>
           <a:prstGeom prst="rect">
             <a:avLst/>
@@ -5068,7 +4882,7 @@
         <p:spPr>
           <a:xfrm>
             <a:off x="3200400" y="2651760"/>
-            <a:ext cx="4205880" cy="1737000"/>
+            <a:ext cx="4205520" cy="1736640"/>
           </a:xfrm>
           <a:prstGeom prst="rect">
             <a:avLst/>
@@ -5136,7 +4950,7 @@
         <p:spPr>
           <a:xfrm flipH="1">
             <a:off x="-720" y="-19080"/>
-            <a:ext cx="1980360" cy="5142960"/>
+            <a:ext cx="1980000" cy="5142600"/>
           </a:xfrm>
           <a:prstGeom prst="rect">
             <a:avLst/>
@@ -5164,7 +4978,7 @@
         <p:spPr>
           <a:xfrm>
             <a:off x="205560" y="308880"/>
-            <a:ext cx="1570680" cy="303120"/>
+            <a:ext cx="1570320" cy="302760"/>
           </a:xfrm>
           <a:prstGeom prst="rect">
             <a:avLst/>
@@ -5213,7 +5027,7 @@
         <p:spPr>
           <a:xfrm>
             <a:off x="2743200" y="274320"/>
-            <a:ext cx="5866560" cy="4892400"/>
+            <a:ext cx="5866200" cy="4892040"/>
           </a:xfrm>
           <a:prstGeom prst="rect">
             <a:avLst/>
@@ -5282,7 +5096,7 @@
             </a:endParaRPr>
           </a:p>
           <a:p>
-            <a:pPr marL="216000" indent="-216000">
+            <a:pPr marL="216000" indent="-215640">
               <a:lnSpc>
                 <a:spcPct val="100000"/>
               </a:lnSpc>
@@ -5290,8 +5104,8 @@
                 <a:srgbClr val="046086"/>
               </a:buClr>
               <a:buSzPct val="45000"/>
-              <a:buFont typeface="Wingdings"/>
-              <a:buChar char="l"/>
+              <a:buFont typeface="Wingdings" charset="2"/>
+              <a:buChar char=""/>
             </a:pPr>
             <a:r>
               <a:rPr b="0" lang="en-GB" sz="1800" spc="-1" strike="noStrike">
@@ -5308,7 +5122,7 @@
             </a:endParaRPr>
           </a:p>
           <a:p>
-            <a:pPr marL="216000" indent="-216000">
+            <a:pPr marL="216000" indent="-215640">
               <a:lnSpc>
                 <a:spcPct val="120000"/>
               </a:lnSpc>
@@ -5316,8 +5130,8 @@
                 <a:srgbClr val="046086"/>
               </a:buClr>
               <a:buSzPct val="45000"/>
-              <a:buFont typeface="Wingdings"/>
-              <a:buChar char="l"/>
+              <a:buFont typeface="Wingdings" charset="2"/>
+              <a:buChar char=""/>
             </a:pPr>
             <a:r>
               <a:rPr b="0" lang="en-GB" sz="1800" spc="-1" strike="noStrike">
@@ -5334,7 +5148,7 @@
             </a:endParaRPr>
           </a:p>
           <a:p>
-            <a:pPr marL="216000" indent="-216000">
+            <a:pPr marL="216000" indent="-215640">
               <a:lnSpc>
                 <a:spcPct val="120000"/>
               </a:lnSpc>
@@ -5342,8 +5156,8 @@
                 <a:srgbClr val="046086"/>
               </a:buClr>
               <a:buSzPct val="45000"/>
-              <a:buFont typeface="Wingdings"/>
-              <a:buChar char="l"/>
+              <a:buFont typeface="Wingdings" charset="2"/>
+              <a:buChar char=""/>
             </a:pPr>
             <a:r>
               <a:rPr b="0" lang="en-GB" sz="1800" spc="-1" strike="noStrike">
@@ -5360,7 +5174,7 @@
             </a:endParaRPr>
           </a:p>
           <a:p>
-            <a:pPr marL="216000" indent="-216000">
+            <a:pPr marL="216000" indent="-215640">
               <a:lnSpc>
                 <a:spcPct val="120000"/>
               </a:lnSpc>
@@ -5368,8 +5182,8 @@
                 <a:srgbClr val="046086"/>
               </a:buClr>
               <a:buSzPct val="45000"/>
-              <a:buFont typeface="Wingdings"/>
-              <a:buChar char="l"/>
+              <a:buFont typeface="Wingdings" charset="2"/>
+              <a:buChar char=""/>
             </a:pPr>
             <a:r>
               <a:rPr b="0" lang="en-GB" sz="1800" spc="-1" strike="noStrike">
@@ -5485,7 +5299,7 @@
         <p:spPr>
           <a:xfrm flipH="1">
             <a:off x="-720" y="-19080"/>
-            <a:ext cx="1980360" cy="5142960"/>
+            <a:ext cx="1980000" cy="5142600"/>
           </a:xfrm>
           <a:prstGeom prst="rect">
             <a:avLst/>
@@ -5513,7 +5327,7 @@
         <p:spPr>
           <a:xfrm>
             <a:off x="409680" y="1097280"/>
-            <a:ext cx="1570680" cy="942480"/>
+            <a:ext cx="1570320" cy="942120"/>
           </a:xfrm>
           <a:prstGeom prst="rect">
             <a:avLst/>
@@ -5572,7 +5386,7 @@
         <p:spPr>
           <a:xfrm>
             <a:off x="2557440" y="199800"/>
-            <a:ext cx="5866560" cy="4264200"/>
+            <a:ext cx="5866200" cy="4263840"/>
           </a:xfrm>
           <a:prstGeom prst="rect">
             <a:avLst/>
@@ -5631,7 +5445,7 @@
             </a:endParaRPr>
           </a:p>
           <a:p>
-            <a:pPr marL="216000" indent="-216000">
+            <a:pPr marL="216000" indent="-215640">
               <a:lnSpc>
                 <a:spcPct val="120000"/>
               </a:lnSpc>
@@ -5639,8 +5453,8 @@
                 <a:srgbClr val="046086"/>
               </a:buClr>
               <a:buSzPct val="45000"/>
-              <a:buFont typeface="Wingdings"/>
-              <a:buChar char="l"/>
+              <a:buFont typeface="Wingdings" charset="2"/>
+              <a:buChar char=""/>
             </a:pPr>
             <a:r>
               <a:rPr b="0" lang="en-GB" sz="1600" spc="-1" strike="noStrike">
@@ -5657,7 +5471,7 @@
             </a:endParaRPr>
           </a:p>
           <a:p>
-            <a:pPr marL="216000" indent="-216000">
+            <a:pPr marL="216000" indent="-215640">
               <a:lnSpc>
                 <a:spcPct val="120000"/>
               </a:lnSpc>
@@ -5665,8 +5479,8 @@
                 <a:srgbClr val="046086"/>
               </a:buClr>
               <a:buSzPct val="45000"/>
-              <a:buFont typeface="Wingdings"/>
-              <a:buChar char="l"/>
+              <a:buFont typeface="Wingdings" charset="2"/>
+              <a:buChar char=""/>
             </a:pPr>
             <a:r>
               <a:rPr b="0" lang="en-GB" sz="1600" spc="-1" strike="noStrike">
@@ -5683,7 +5497,7 @@
             </a:endParaRPr>
           </a:p>
           <a:p>
-            <a:pPr marL="216000" indent="-216000">
+            <a:pPr marL="216000" indent="-215640">
               <a:lnSpc>
                 <a:spcPct val="120000"/>
               </a:lnSpc>
@@ -5691,8 +5505,8 @@
                 <a:srgbClr val="046086"/>
               </a:buClr>
               <a:buSzPct val="45000"/>
-              <a:buFont typeface="Wingdings"/>
-              <a:buChar char="l"/>
+              <a:buFont typeface="Wingdings" charset="2"/>
+              <a:buChar char=""/>
             </a:pPr>
             <a:r>
               <a:rPr b="0" lang="en-GB" sz="1600" spc="-1" strike="noStrike">
@@ -5709,7 +5523,7 @@
             </a:endParaRPr>
           </a:p>
           <a:p>
-            <a:pPr marL="216000" indent="-216000">
+            <a:pPr marL="216000" indent="-215640">
               <a:lnSpc>
                 <a:spcPct val="120000"/>
               </a:lnSpc>
@@ -5717,8 +5531,8 @@
                 <a:srgbClr val="046086"/>
               </a:buClr>
               <a:buSzPct val="45000"/>
-              <a:buFont typeface="Wingdings"/>
-              <a:buChar char="l"/>
+              <a:buFont typeface="Wingdings" charset="2"/>
+              <a:buChar char=""/>
             </a:pPr>
             <a:r>
               <a:rPr b="0" lang="en-GB" sz="1600" spc="-1" strike="noStrike">
@@ -5735,7 +5549,7 @@
             </a:endParaRPr>
           </a:p>
           <a:p>
-            <a:pPr marL="216000" indent="-216000">
+            <a:pPr marL="216000" indent="-215640">
               <a:lnSpc>
                 <a:spcPct val="120000"/>
               </a:lnSpc>
@@ -5743,8 +5557,8 @@
                 <a:srgbClr val="046086"/>
               </a:buClr>
               <a:buSzPct val="45000"/>
-              <a:buFont typeface="Wingdings"/>
-              <a:buChar char="l"/>
+              <a:buFont typeface="Wingdings" charset="2"/>
+              <a:buChar char=""/>
             </a:pPr>
             <a:r>
               <a:rPr b="0" lang="en-GB" sz="1600" spc="-1" strike="noStrike">
@@ -5761,7 +5575,7 @@
             </a:endParaRPr>
           </a:p>
           <a:p>
-            <a:pPr marL="216000" indent="-216000">
+            <a:pPr marL="216000" indent="-215640">
               <a:lnSpc>
                 <a:spcPct val="120000"/>
               </a:lnSpc>
@@ -5769,8 +5583,8 @@
                 <a:srgbClr val="046086"/>
               </a:buClr>
               <a:buSzPct val="45000"/>
-              <a:buFont typeface="Wingdings"/>
-              <a:buChar char="l"/>
+              <a:buFont typeface="Wingdings" charset="2"/>
+              <a:buChar char=""/>
             </a:pPr>
             <a:r>
               <a:rPr b="0" lang="en-GB" sz="1600" spc="-1" strike="noStrike">
@@ -5787,7 +5601,7 @@
             </a:endParaRPr>
           </a:p>
           <a:p>
-            <a:pPr marL="216000" indent="-216000">
+            <a:pPr marL="216000" indent="-215640">
               <a:lnSpc>
                 <a:spcPct val="120000"/>
               </a:lnSpc>
@@ -5795,8 +5609,8 @@
                 <a:srgbClr val="046086"/>
               </a:buClr>
               <a:buSzPct val="45000"/>
-              <a:buFont typeface="Wingdings"/>
-              <a:buChar char="l"/>
+              <a:buFont typeface="Wingdings" charset="2"/>
+              <a:buChar char=""/>
             </a:pPr>
             <a:r>
               <a:rPr b="0" lang="en-GB" sz="1600" spc="-1" strike="noStrike">
@@ -5813,7 +5627,7 @@
             </a:endParaRPr>
           </a:p>
           <a:p>
-            <a:pPr marL="216000" indent="-216000">
+            <a:pPr marL="216000" indent="-215640">
               <a:lnSpc>
                 <a:spcPct val="120000"/>
               </a:lnSpc>
@@ -5821,8 +5635,8 @@
                 <a:srgbClr val="046086"/>
               </a:buClr>
               <a:buSzPct val="45000"/>
-              <a:buFont typeface="Wingdings"/>
-              <a:buChar char="l"/>
+              <a:buFont typeface="Wingdings" charset="2"/>
+              <a:buChar char=""/>
             </a:pPr>
             <a:r>
               <a:rPr b="0" lang="en-GB" sz="1600" spc="-1" strike="noStrike">
@@ -5839,7 +5653,7 @@
             </a:endParaRPr>
           </a:p>
           <a:p>
-            <a:pPr marL="216000" indent="-216000">
+            <a:pPr marL="216000" indent="-215640">
               <a:lnSpc>
                 <a:spcPct val="120000"/>
               </a:lnSpc>
@@ -5847,8 +5661,8 @@
                 <a:srgbClr val="046086"/>
               </a:buClr>
               <a:buSzPct val="45000"/>
-              <a:buFont typeface="Wingdings"/>
-              <a:buChar char="l"/>
+              <a:buFont typeface="Wingdings" charset="2"/>
+              <a:buChar char=""/>
             </a:pPr>
             <a:r>
               <a:rPr b="0" lang="en-GB" sz="1600" spc="-1" strike="noStrike">
@@ -5924,7 +5738,7 @@
         <p:spPr>
           <a:xfrm flipH="1">
             <a:off x="-720" y="-19080"/>
-            <a:ext cx="1980360" cy="5142960"/>
+            <a:ext cx="1980000" cy="5142600"/>
           </a:xfrm>
           <a:prstGeom prst="rect">
             <a:avLst/>
@@ -5952,7 +5766,7 @@
         <p:spPr>
           <a:xfrm>
             <a:off x="205560" y="308880"/>
-            <a:ext cx="1570680" cy="728640"/>
+            <a:ext cx="1570320" cy="728280"/>
           </a:xfrm>
           <a:prstGeom prst="rect">
             <a:avLst/>
@@ -6001,7 +5815,7 @@
         <p:spPr>
           <a:xfrm>
             <a:off x="2560320" y="182880"/>
-            <a:ext cx="5866560" cy="5216400"/>
+            <a:ext cx="5866200" cy="5216040"/>
           </a:xfrm>
           <a:prstGeom prst="rect">
             <a:avLst/>
@@ -6080,7 +5894,7 @@
             </a:endParaRPr>
           </a:p>
           <a:p>
-            <a:pPr marL="216000" indent="-216000">
+            <a:pPr marL="216000" indent="-215640">
               <a:lnSpc>
                 <a:spcPct val="100000"/>
               </a:lnSpc>
@@ -6088,8 +5902,8 @@
                 <a:srgbClr val="046086"/>
               </a:buClr>
               <a:buSzPct val="45000"/>
-              <a:buFont typeface="Wingdings"/>
-              <a:buChar char="l"/>
+              <a:buFont typeface="Wingdings" charset="2"/>
+              <a:buChar char=""/>
             </a:pPr>
             <a:r>
               <a:rPr b="0" lang="en-GB" sz="1800" spc="-1" strike="noStrike">
@@ -6106,7 +5920,7 @@
             </a:endParaRPr>
           </a:p>
           <a:p>
-            <a:pPr marL="216000" indent="-216000">
+            <a:pPr marL="216000" indent="-215640">
               <a:lnSpc>
                 <a:spcPct val="100000"/>
               </a:lnSpc>
@@ -6114,8 +5928,8 @@
                 <a:srgbClr val="046086"/>
               </a:buClr>
               <a:buSzPct val="45000"/>
-              <a:buFont typeface="Wingdings"/>
-              <a:buChar char="l"/>
+              <a:buFont typeface="Wingdings" charset="2"/>
+              <a:buChar char=""/>
             </a:pPr>
             <a:r>
               <a:rPr b="0" lang="en-GB" sz="1800" spc="-1" strike="noStrike">
@@ -6132,7 +5946,7 @@
             </a:endParaRPr>
           </a:p>
           <a:p>
-            <a:pPr marL="216000" indent="-216000">
+            <a:pPr marL="216000" indent="-215640">
               <a:lnSpc>
                 <a:spcPct val="100000"/>
               </a:lnSpc>
@@ -6140,8 +5954,8 @@
                 <a:srgbClr val="046086"/>
               </a:buClr>
               <a:buSzPct val="45000"/>
-              <a:buFont typeface="Wingdings"/>
-              <a:buChar char="l"/>
+              <a:buFont typeface="Wingdings" charset="2"/>
+              <a:buChar char=""/>
             </a:pPr>
             <a:r>
               <a:rPr b="0" lang="en-GB" sz="1800" spc="-1" strike="noStrike">
@@ -6160,6 +5974,7 @@
                   <a:srgbClr val="046086"/>
                 </a:solidFill>
                 <a:latin typeface="Open Sans"/>
+                <a:ea typeface="DejaVu Sans"/>
               </a:rPr>
               <a:t> </a:t>
             </a:r>
@@ -6212,7 +6027,7 @@
         <p:spPr>
           <a:xfrm>
             <a:off x="2584800" y="3564720"/>
-            <a:ext cx="6343200" cy="971280"/>
+            <a:ext cx="6342840" cy="970920"/>
           </a:xfrm>
           <a:prstGeom prst="rect">
             <a:avLst/>
@@ -6280,7 +6095,7 @@
         <p:spPr>
           <a:xfrm flipH="1">
             <a:off x="-720" y="-19080"/>
-            <a:ext cx="1980360" cy="5142960"/>
+            <a:ext cx="1980000" cy="5142600"/>
           </a:xfrm>
           <a:prstGeom prst="rect">
             <a:avLst/>
@@ -6308,7 +6123,7 @@
         <p:spPr>
           <a:xfrm>
             <a:off x="205560" y="308880"/>
-            <a:ext cx="1570680" cy="728640"/>
+            <a:ext cx="1570320" cy="728280"/>
           </a:xfrm>
           <a:prstGeom prst="rect">
             <a:avLst/>
@@ -6367,7 +6182,7 @@
         <p:spPr>
           <a:xfrm>
             <a:off x="2567520" y="-195120"/>
-            <a:ext cx="6615000" cy="5514840"/>
+            <a:ext cx="6614640" cy="5514480"/>
           </a:xfrm>
           <a:prstGeom prst="rect">
             <a:avLst/>
@@ -6396,7 +6211,7 @@
             </a:endParaRPr>
           </a:p>
           <a:p>
-            <a:pPr marL="216000" indent="-216000">
+            <a:pPr marL="216000" indent="-215640">
               <a:lnSpc>
                 <a:spcPct val="120000"/>
               </a:lnSpc>
@@ -6404,8 +6219,8 @@
                 <a:srgbClr val="046086"/>
               </a:buClr>
               <a:buSzPct val="45000"/>
-              <a:buFont typeface="Wingdings"/>
-              <a:buChar char="l"/>
+              <a:buFont typeface="Wingdings" charset="2"/>
+              <a:buChar char=""/>
             </a:pPr>
             <a:r>
               <a:rPr b="0" lang="en-GB" sz="2000" spc="-1" strike="noStrike">
@@ -6422,7 +6237,7 @@
             </a:endParaRPr>
           </a:p>
           <a:p>
-            <a:pPr marL="216000" indent="-216000">
+            <a:pPr marL="216000" indent="-215640">
               <a:lnSpc>
                 <a:spcPct val="120000"/>
               </a:lnSpc>
@@ -6430,8 +6245,8 @@
                 <a:srgbClr val="046086"/>
               </a:buClr>
               <a:buSzPct val="45000"/>
-              <a:buFont typeface="Wingdings"/>
-              <a:buChar char="l"/>
+              <a:buFont typeface="Wingdings" charset="2"/>
+              <a:buChar char=""/>
             </a:pPr>
             <a:r>
               <a:rPr b="0" lang="en-GB" sz="2000" spc="-1" strike="noStrike">
@@ -6448,7 +6263,7 @@
             </a:endParaRPr>
           </a:p>
           <a:p>
-            <a:pPr marL="216000" indent="-216000">
+            <a:pPr marL="216000" indent="-215640">
               <a:lnSpc>
                 <a:spcPct val="120000"/>
               </a:lnSpc>
@@ -6456,8 +6271,8 @@
                 <a:srgbClr val="046086"/>
               </a:buClr>
               <a:buSzPct val="45000"/>
-              <a:buFont typeface="Wingdings"/>
-              <a:buChar char="l"/>
+              <a:buFont typeface="Wingdings" charset="2"/>
+              <a:buChar char=""/>
             </a:pPr>
             <a:r>
               <a:rPr b="0" lang="en-GB" sz="2000" spc="-1" strike="noStrike">
@@ -6474,7 +6289,7 @@
             </a:endParaRPr>
           </a:p>
           <a:p>
-            <a:pPr marL="216000" indent="-216000">
+            <a:pPr marL="216000" indent="-215640">
               <a:lnSpc>
                 <a:spcPct val="120000"/>
               </a:lnSpc>
@@ -6482,8 +6297,8 @@
                 <a:srgbClr val="046086"/>
               </a:buClr>
               <a:buSzPct val="45000"/>
-              <a:buFont typeface="Wingdings"/>
-              <a:buChar char="l"/>
+              <a:buFont typeface="Wingdings" charset="2"/>
+              <a:buChar char=""/>
             </a:pPr>
             <a:r>
               <a:rPr b="0" lang="en-GB" sz="2000" spc="-1" strike="noStrike">
@@ -6500,7 +6315,7 @@
             </a:endParaRPr>
           </a:p>
           <a:p>
-            <a:pPr marL="216000" indent="-216000">
+            <a:pPr marL="216000" indent="-215640">
               <a:lnSpc>
                 <a:spcPct val="120000"/>
               </a:lnSpc>
@@ -6508,8 +6323,8 @@
                 <a:srgbClr val="046086"/>
               </a:buClr>
               <a:buSzPct val="45000"/>
-              <a:buFont typeface="Wingdings"/>
-              <a:buChar char="l"/>
+              <a:buFont typeface="Wingdings" charset="2"/>
+              <a:buChar char=""/>
             </a:pPr>
             <a:r>
               <a:rPr b="0" lang="en-GB" sz="2000" spc="-1" strike="noStrike">
@@ -6526,7 +6341,7 @@
             </a:endParaRPr>
           </a:p>
           <a:p>
-            <a:pPr marL="216000" indent="-216000">
+            <a:pPr marL="216000" indent="-215640">
               <a:lnSpc>
                 <a:spcPct val="120000"/>
               </a:lnSpc>
@@ -6534,8 +6349,8 @@
                 <a:srgbClr val="046086"/>
               </a:buClr>
               <a:buSzPct val="45000"/>
-              <a:buFont typeface="Wingdings"/>
-              <a:buChar char="l"/>
+              <a:buFont typeface="Wingdings" charset="2"/>
+              <a:buChar char=""/>
             </a:pPr>
             <a:r>
               <a:rPr b="0" lang="en-GB" sz="2000" spc="-1" strike="noStrike">
@@ -6701,7 +6516,7 @@
         <p:spPr>
           <a:xfrm flipH="1">
             <a:off x="-720" y="-19080"/>
-            <a:ext cx="1980360" cy="5142960"/>
+            <a:ext cx="1980000" cy="5142600"/>
           </a:xfrm>
           <a:prstGeom prst="rect">
             <a:avLst/>
@@ -6729,7 +6544,7 @@
         <p:spPr>
           <a:xfrm>
             <a:off x="205560" y="308880"/>
-            <a:ext cx="1570680" cy="729360"/>
+            <a:ext cx="1570320" cy="729000"/>
           </a:xfrm>
           <a:prstGeom prst="rect">
             <a:avLst/>
@@ -6782,7 +6597,7 @@
         <p:spPr>
           <a:xfrm>
             <a:off x="2743200" y="731520"/>
-            <a:ext cx="5840640" cy="3411000"/>
+            <a:ext cx="5840280" cy="3410640"/>
           </a:xfrm>
           <a:prstGeom prst="rect">
             <a:avLst/>

</xml_diff>